<commit_message>
final changes to talks
</commit_message>
<xml_diff>
--- a/esa2013/ignite/ignite_scott.pptx
+++ b/esa2013/ignite/ignite_scott.pptx
@@ -14,17 +14,17 @@
     <p:sldId id="259" r:id="rId8"/>
     <p:sldId id="260" r:id="rId9"/>
     <p:sldId id="261" r:id="rId10"/>
-    <p:sldId id="262" r:id="rId11"/>
-    <p:sldId id="263" r:id="rId12"/>
-    <p:sldId id="264" r:id="rId13"/>
-    <p:sldId id="265" r:id="rId14"/>
-    <p:sldId id="266" r:id="rId15"/>
-    <p:sldId id="267" r:id="rId16"/>
+    <p:sldId id="263" r:id="rId11"/>
+    <p:sldId id="264" r:id="rId12"/>
+    <p:sldId id="267" r:id="rId13"/>
+    <p:sldId id="262" r:id="rId14"/>
+    <p:sldId id="265" r:id="rId15"/>
+    <p:sldId id="266" r:id="rId16"/>
     <p:sldId id="268" r:id="rId17"/>
     <p:sldId id="276" r:id="rId18"/>
     <p:sldId id="277" r:id="rId19"/>
-    <p:sldId id="272" r:id="rId20"/>
-    <p:sldId id="273" r:id="rId21"/>
+    <p:sldId id="281" r:id="rId20"/>
+    <p:sldId id="272" r:id="rId21"/>
   </p:sldIdLst>
   <p:sldSz cx="9144000" cy="6858000" type="screen4x3"/>
   <p:notesSz cx="6858000" cy="9144000"/>
@@ -306,7 +306,7 @@
           <a:lstStyle/>
           <a:p>
             <a:fld id="{FE6204BF-6B68-3242-8716-47D11FEA542A}" type="datetimeFigureOut">
-              <a:t>2013-07-26</a:t>
+              <a:t>2013-08-04</a:t>
             </a:fld>
             <a:endParaRPr lang="en-US"/>
           </a:p>
@@ -474,7 +474,7 @@
           <a:lstStyle/>
           <a:p>
             <a:fld id="{FE6204BF-6B68-3242-8716-47D11FEA542A}" type="datetimeFigureOut">
-              <a:t>2013-07-26</a:t>
+              <a:t>2013-08-04</a:t>
             </a:fld>
             <a:endParaRPr lang="en-US"/>
           </a:p>
@@ -652,7 +652,7 @@
           <a:lstStyle/>
           <a:p>
             <a:fld id="{FE6204BF-6B68-3242-8716-47D11FEA542A}" type="datetimeFigureOut">
-              <a:t>2013-07-26</a:t>
+              <a:t>2013-08-04</a:t>
             </a:fld>
             <a:endParaRPr lang="en-US"/>
           </a:p>
@@ -820,7 +820,7 @@
           <a:lstStyle/>
           <a:p>
             <a:fld id="{FE6204BF-6B68-3242-8716-47D11FEA542A}" type="datetimeFigureOut">
-              <a:t>2013-07-26</a:t>
+              <a:t>2013-08-04</a:t>
             </a:fld>
             <a:endParaRPr lang="en-US"/>
           </a:p>
@@ -1064,7 +1064,7 @@
           <a:lstStyle/>
           <a:p>
             <a:fld id="{FE6204BF-6B68-3242-8716-47D11FEA542A}" type="datetimeFigureOut">
-              <a:t>2013-07-26</a:t>
+              <a:t>2013-08-04</a:t>
             </a:fld>
             <a:endParaRPr lang="en-US"/>
           </a:p>
@@ -1350,7 +1350,7 @@
           <a:lstStyle/>
           <a:p>
             <a:fld id="{FE6204BF-6B68-3242-8716-47D11FEA542A}" type="datetimeFigureOut">
-              <a:t>2013-07-26</a:t>
+              <a:t>2013-08-04</a:t>
             </a:fld>
             <a:endParaRPr lang="en-US"/>
           </a:p>
@@ -1770,7 +1770,7 @@
           <a:lstStyle/>
           <a:p>
             <a:fld id="{FE6204BF-6B68-3242-8716-47D11FEA542A}" type="datetimeFigureOut">
-              <a:t>2013-07-26</a:t>
+              <a:t>2013-08-04</a:t>
             </a:fld>
             <a:endParaRPr lang="en-US"/>
           </a:p>
@@ -1886,7 +1886,7 @@
           <a:lstStyle/>
           <a:p>
             <a:fld id="{FE6204BF-6B68-3242-8716-47D11FEA542A}" type="datetimeFigureOut">
-              <a:t>2013-07-26</a:t>
+              <a:t>2013-08-04</a:t>
             </a:fld>
             <a:endParaRPr lang="en-US"/>
           </a:p>
@@ -1979,7 +1979,7 @@
           <a:lstStyle/>
           <a:p>
             <a:fld id="{FE6204BF-6B68-3242-8716-47D11FEA542A}" type="datetimeFigureOut">
-              <a:t>2013-07-26</a:t>
+              <a:t>2013-08-04</a:t>
             </a:fld>
             <a:endParaRPr lang="en-US"/>
           </a:p>
@@ -2254,7 +2254,7 @@
           <a:lstStyle/>
           <a:p>
             <a:fld id="{FE6204BF-6B68-3242-8716-47D11FEA542A}" type="datetimeFigureOut">
-              <a:t>2013-07-26</a:t>
+              <a:t>2013-08-04</a:t>
             </a:fld>
             <a:endParaRPr lang="en-US"/>
           </a:p>
@@ -2508,7 +2508,7 @@
           <a:lstStyle/>
           <a:p>
             <a:fld id="{FE6204BF-6B68-3242-8716-47D11FEA542A}" type="datetimeFigureOut">
-              <a:t>2013-07-26</a:t>
+              <a:t>2013-08-04</a:t>
             </a:fld>
             <a:endParaRPr lang="en-US"/>
           </a:p>
@@ -2719,7 +2719,7 @@
           </a:lstStyle>
           <a:p>
             <a:fld id="{FE6204BF-6B68-3242-8716-47D11FEA542A}" type="datetimeFigureOut">
-              <a:t>2013-07-26</a:t>
+              <a:t>2013-08-04</a:t>
             </a:fld>
             <a:endParaRPr lang="en-US"/>
           </a:p>
@@ -3181,8 +3181,8 @@
         </p:nvSpPr>
         <p:spPr>
           <a:xfrm>
-            <a:off x="322714" y="44368"/>
-            <a:ext cx="3358487" cy="400110"/>
+            <a:off x="322714" y="244423"/>
+            <a:ext cx="2623986" cy="400110"/>
           </a:xfrm>
           <a:prstGeom prst="rect">
             <a:avLst/>
@@ -3197,14 +3197,14 @@
           <a:p>
             <a:r>
               <a:rPr lang="en-US" sz="2000" b="1"/>
-              <a:t>Data increasingly on the web</a:t>
+              <a:t>R is a good solution</a:t>
             </a:r>
           </a:p>
         </p:txBody>
       </p:sp>
       <p:pic>
         <p:nvPicPr>
-          <p:cNvPr id="2" name="Picture 1" descr="data.png"/>
+          <p:cNvPr id="2" name="Picture 1" descr="r.png"/>
           <p:cNvPicPr>
             <a:picLocks noChangeAspect="1"/>
           </p:cNvPicPr>
@@ -3224,8 +3224,8 @@
         </p:blipFill>
         <p:spPr>
           <a:xfrm>
-            <a:off x="558800" y="600887"/>
-            <a:ext cx="8128000" cy="6096000"/>
+            <a:off x="843551" y="832140"/>
+            <a:ext cx="7441684" cy="5618471"/>
           </a:xfrm>
           <a:prstGeom prst="rect">
             <a:avLst/>
@@ -3235,7 +3235,7 @@
     </p:spTree>
     <p:extLst>
       <p:ext uri="{BB962C8B-B14F-4D97-AF65-F5344CB8AC3E}">
-        <p14:creationId xmlns:p14="http://schemas.microsoft.com/office/powerpoint/2010/main" val="2813685723"/>
+        <p14:creationId xmlns:p14="http://schemas.microsoft.com/office/powerpoint/2010/main" val="3725707605"/>
       </p:ext>
     </p:extLst>
   </p:cSld>
@@ -3264,14 +3264,48 @@
       </p:grpSpPr>
       <p:sp>
         <p:nvSpPr>
+          <p:cNvPr id="2" name="Content Placeholder 1"/>
+          <p:cNvSpPr>
+            <a:spLocks noGrp="1"/>
+          </p:cNvSpPr>
+          <p:nvPr>
+            <p:ph idx="1"/>
+          </p:nvPr>
+        </p:nvSpPr>
+        <p:spPr/>
+        <p:txBody>
+          <a:bodyPr/>
+          <a:lstStyle/>
+          <a:p>
+            <a:r>
+              <a:rPr lang="en-US"/>
+              <a:t>R is Open source = Free + Rapid change</a:t>
+            </a:r>
+          </a:p>
+          <a:p>
+            <a:r>
+              <a:rPr lang="en-US"/>
+              <a:t>R = entire workflow in 1 place</a:t>
+            </a:r>
+          </a:p>
+          <a:p>
+            <a:r>
+              <a:rPr lang="en-US"/>
+              <a:t>R = reproducible science</a:t>
+            </a:r>
+          </a:p>
+        </p:txBody>
+      </p:sp>
+      <p:sp>
+        <p:nvSpPr>
           <p:cNvPr id="6" name="TextBox 5"/>
           <p:cNvSpPr txBox="1"/>
           <p:nvPr/>
         </p:nvSpPr>
         <p:spPr>
           <a:xfrm>
-            <a:off x="322714" y="44368"/>
-            <a:ext cx="3329056" cy="400110"/>
+            <a:off x="322714" y="357118"/>
+            <a:ext cx="1174746" cy="523220"/>
           </a:xfrm>
           <a:prstGeom prst="rect">
             <a:avLst/>
@@ -3285,46 +3319,16 @@
           <a:lstStyle/>
           <a:p>
             <a:r>
-              <a:rPr lang="en-US" sz="2000" b="1"/>
-              <a:t>R may be the perfect solution</a:t>
-            </a:r>
-          </a:p>
-        </p:txBody>
-      </p:sp>
-      <p:pic>
-        <p:nvPicPr>
-          <p:cNvPr id="2" name="Picture 1" descr="r.png"/>
-          <p:cNvPicPr>
-            <a:picLocks noChangeAspect="1"/>
-          </p:cNvPicPr>
-          <p:nvPr/>
-        </p:nvPicPr>
-        <p:blipFill>
-          <a:blip r:embed="rId2">
-            <a:extLst>
-              <a:ext uri="{28A0092B-C50C-407E-A947-70E740481C1C}">
-                <a14:useLocalDpi xmlns:a14="http://schemas.microsoft.com/office/drawing/2010/main" val="0"/>
-              </a:ext>
-            </a:extLst>
-          </a:blip>
-          <a:stretch>
-            <a:fillRect/>
-          </a:stretch>
-        </p:blipFill>
-        <p:spPr>
-          <a:xfrm>
-            <a:off x="930622" y="697512"/>
-            <a:ext cx="7620000" cy="5753100"/>
-          </a:xfrm>
-          <a:prstGeom prst="rect">
-            <a:avLst/>
-          </a:prstGeom>
-        </p:spPr>
-      </p:pic>
+              <a:rPr lang="en-US" sz="2800" b="1"/>
+              <a:t>Why?</a:t>
+            </a:r>
+          </a:p>
+        </p:txBody>
+      </p:sp>
     </p:spTree>
     <p:extLst>
       <p:ext uri="{BB962C8B-B14F-4D97-AF65-F5344CB8AC3E}">
-        <p14:creationId xmlns:p14="http://schemas.microsoft.com/office/powerpoint/2010/main" val="3725707605"/>
+        <p14:creationId xmlns:p14="http://schemas.microsoft.com/office/powerpoint/2010/main" val="3522749986"/>
       </p:ext>
     </p:extLst>
   </p:cSld>
@@ -3353,7 +3357,7 @@
       </p:grpSpPr>
       <p:sp>
         <p:nvSpPr>
-          <p:cNvPr id="2" name="Content Placeholder 1"/>
+          <p:cNvPr id="3" name="Content Placeholder 2"/>
           <p:cNvSpPr>
             <a:spLocks noGrp="1"/>
           </p:cNvSpPr>
@@ -3361,63 +3365,266 @@
             <p:ph idx="1"/>
           </p:nvPr>
         </p:nvSpPr>
-        <p:spPr/>
-        <p:txBody>
-          <a:bodyPr/>
-          <a:lstStyle/>
-          <a:p>
-            <a:r>
-              <a:rPr lang="en-US"/>
-              <a:t>R is Open source = Free + Rapid change</a:t>
-            </a:r>
-          </a:p>
-          <a:p>
-            <a:r>
-              <a:rPr lang="en-US"/>
-              <a:t>R = entire workflow in 1 place</a:t>
-            </a:r>
-          </a:p>
-          <a:p>
-            <a:r>
-              <a:rPr lang="en-US"/>
-              <a:t>R = reproducible science</a:t>
-            </a:r>
-          </a:p>
-        </p:txBody>
-      </p:sp>
-      <p:sp>
-        <p:nvSpPr>
-          <p:cNvPr id="6" name="TextBox 5"/>
-          <p:cNvSpPr txBox="1"/>
+        <p:spPr>
+          <a:xfrm>
+            <a:off x="296073" y="398047"/>
+            <a:ext cx="8229600" cy="6188665"/>
+          </a:xfrm>
+        </p:spPr>
+        <p:txBody>
+          <a:bodyPr>
+            <a:normAutofit fontScale="55000" lnSpcReduction="20000"/>
+          </a:bodyPr>
+          <a:lstStyle/>
+          <a:p>
+            <a:pPr marL="0" indent="0">
+              <a:buNone/>
+            </a:pPr>
+            <a:r>
+              <a:rPr lang="en-US" sz="3600" b="1"/>
+              <a:t>Get some data from the web</a:t>
+            </a:r>
+          </a:p>
+          <a:p>
+            <a:pPr marL="0" indent="0">
+              <a:buNone/>
+            </a:pPr>
+            <a:r>
+              <a:rPr lang="en-US">
+                <a:solidFill>
+                  <a:schemeClr val="tx1">
+                    <a:lumMod val="65000"/>
+                  </a:schemeClr>
+                </a:solidFill>
+              </a:rPr>
+              <a:t>library(RCurl); library(RJSONIO)</a:t>
+            </a:r>
+          </a:p>
+          <a:p>
+            <a:pPr marL="0" indent="0">
+              <a:buNone/>
+            </a:pPr>
+            <a:r>
+              <a:rPr lang="en-US">
+                <a:solidFill>
+                  <a:schemeClr val="tx1">
+                    <a:lumMod val="65000"/>
+                  </a:schemeClr>
+                </a:solidFill>
+              </a:rPr>
+              <a:t>dat &lt;- fromJSON(getURL("https://api.github.com/users/hadley/repos"))</a:t>
+            </a:r>
+          </a:p>
+          <a:p>
+            <a:pPr marL="0" indent="0">
+              <a:buNone/>
+            </a:pPr>
+            <a:endParaRPr lang="en-US"/>
+          </a:p>
+          <a:p>
+            <a:pPr marL="0" indent="0">
+              <a:buNone/>
+            </a:pPr>
+            <a:r>
+              <a:rPr lang="en-US" sz="3600" b="1"/>
+              <a:t>Manipulate the data</a:t>
+            </a:r>
+          </a:p>
+          <a:p>
+            <a:pPr marL="0" indent="0">
+              <a:buNone/>
+            </a:pPr>
+            <a:r>
+              <a:rPr lang="en-US">
+                <a:solidFill>
+                  <a:schemeClr val="tx1">
+                    <a:lumMod val="65000"/>
+                  </a:schemeClr>
+                </a:solidFill>
+              </a:rPr>
+              <a:t>library(plyr); library(reshape2)</a:t>
+            </a:r>
+          </a:p>
+          <a:p>
+            <a:pPr marL="0" indent="0">
+              <a:buNone/>
+            </a:pPr>
+            <a:r>
+              <a:rPr lang="en-US">
+                <a:solidFill>
+                  <a:schemeClr val="tx1">
+                    <a:lumMod val="65000"/>
+                  </a:schemeClr>
+                </a:solidFill>
+              </a:rPr>
+              <a:t>dat_melt &lt;- melt(ldply(dat, function(x) data.frame(x[names(x) %in% 			c("name","watchers_count","forks")])))</a:t>
+            </a:r>
+          </a:p>
+          <a:p>
+            <a:pPr marL="0" indent="0">
+              <a:buNone/>
+            </a:pPr>
+            <a:endParaRPr lang="en-US"/>
+          </a:p>
+          <a:p>
+            <a:pPr marL="0" indent="0">
+              <a:buNone/>
+            </a:pPr>
+            <a:r>
+              <a:rPr lang="en-US" sz="3600" b="1"/>
+              <a:t>Run some statistical model</a:t>
+            </a:r>
+          </a:p>
+          <a:p>
+            <a:pPr marL="0" indent="0">
+              <a:buNone/>
+            </a:pPr>
+            <a:r>
+              <a:rPr lang="en-US">
+                <a:solidFill>
+                  <a:schemeClr val="tx1">
+                    <a:lumMod val="65000"/>
+                  </a:schemeClr>
+                </a:solidFill>
+              </a:rPr>
+              <a:t>lm(value ~ variable, data = dat_melt)</a:t>
+            </a:r>
+          </a:p>
+          <a:p>
+            <a:pPr marL="0" indent="0">
+              <a:buNone/>
+            </a:pPr>
+            <a:endParaRPr lang="en-US"/>
+          </a:p>
+          <a:p>
+            <a:pPr marL="0" indent="0">
+              <a:buNone/>
+            </a:pPr>
+            <a:r>
+              <a:rPr lang="en-US" sz="3600" b="1"/>
+              <a:t>Visualize results</a:t>
+            </a:r>
+          </a:p>
+          <a:p>
+            <a:pPr marL="0" indent="0">
+              <a:buNone/>
+            </a:pPr>
+            <a:r>
+              <a:rPr lang="en-US">
+                <a:solidFill>
+                  <a:schemeClr val="tx1">
+                    <a:lumMod val="65000"/>
+                  </a:schemeClr>
+                </a:solidFill>
+              </a:rPr>
+              <a:t>library(ggplot2)</a:t>
+            </a:r>
+          </a:p>
+          <a:p>
+            <a:pPr marL="0" indent="0">
+              <a:buNone/>
+            </a:pPr>
+            <a:r>
+              <a:rPr lang="en-US">
+                <a:solidFill>
+                  <a:schemeClr val="tx1">
+                    <a:lumMod val="65000"/>
+                  </a:schemeClr>
+                </a:solidFill>
+              </a:rPr>
+              <a:t>ggplot(dat_melt, aes(name, value, colour = variable)) + </a:t>
+            </a:r>
+          </a:p>
+          <a:p>
+            <a:pPr marL="0" indent="0">
+              <a:buNone/>
+            </a:pPr>
+            <a:r>
+              <a:rPr lang="en-US">
+                <a:solidFill>
+                  <a:schemeClr val="tx1">
+                    <a:lumMod val="65000"/>
+                  </a:schemeClr>
+                </a:solidFill>
+              </a:rPr>
+              <a:t>	geom_point() + </a:t>
+            </a:r>
+          </a:p>
+          <a:p>
+            <a:pPr marL="0" indent="0">
+              <a:buNone/>
+            </a:pPr>
+            <a:r>
+              <a:rPr lang="en-US">
+                <a:solidFill>
+                  <a:schemeClr val="tx1">
+                    <a:lumMod val="65000"/>
+                  </a:schemeClr>
+                </a:solidFill>
+              </a:rPr>
+              <a:t>	coord_flip()</a:t>
+            </a:r>
+          </a:p>
+          <a:p>
+            <a:pPr marL="0" indent="0">
+              <a:buNone/>
+            </a:pPr>
+            <a:endParaRPr lang="en-US"/>
+          </a:p>
+          <a:p>
+            <a:pPr marL="0" indent="0">
+              <a:buNone/>
+            </a:pPr>
+            <a:r>
+              <a:rPr lang="en-US" sz="3600" b="1"/>
+              <a:t>Write the paper</a:t>
+            </a:r>
+          </a:p>
+          <a:p>
+            <a:pPr marL="0" indent="0">
+              <a:buNone/>
+            </a:pPr>
+            <a:r>
+              <a:rPr lang="en-US">
+                <a:solidFill>
+                  <a:schemeClr val="tx1">
+                    <a:lumMod val="65000"/>
+                  </a:schemeClr>
+                </a:solidFill>
+              </a:rPr>
+              <a:t># Introduction...</a:t>
+            </a:r>
+          </a:p>
+        </p:txBody>
+      </p:sp>
+      <p:pic>
+        <p:nvPicPr>
+          <p:cNvPr id="4" name="Picture 3"/>
+          <p:cNvPicPr>
+            <a:picLocks noChangeAspect="1"/>
+          </p:cNvPicPr>
           <p:nvPr/>
-        </p:nvSpPr>
-        <p:spPr>
-          <a:xfrm>
-            <a:off x="322714" y="44368"/>
-            <a:ext cx="795059" cy="400110"/>
+        </p:nvPicPr>
+        <p:blipFill>
+          <a:blip r:embed="rId2"/>
+          <a:stretch>
+            <a:fillRect/>
+          </a:stretch>
+        </p:blipFill>
+        <p:spPr>
+          <a:xfrm>
+            <a:off x="4570048" y="4566939"/>
+            <a:ext cx="4040928" cy="2291061"/>
           </a:xfrm>
           <a:prstGeom prst="rect">
             <a:avLst/>
           </a:prstGeom>
-          <a:noFill/>
-        </p:spPr>
-        <p:txBody>
-          <a:bodyPr wrap="none" rtlCol="0">
-            <a:spAutoFit/>
-          </a:bodyPr>
-          <a:lstStyle/>
-          <a:p>
-            <a:r>
-              <a:rPr lang="en-US" sz="2000" b="1"/>
-              <a:t>Why?</a:t>
-            </a:r>
-          </a:p>
-        </p:txBody>
-      </p:sp>
+        </p:spPr>
+      </p:pic>
     </p:spTree>
     <p:extLst>
       <p:ext uri="{BB962C8B-B14F-4D97-AF65-F5344CB8AC3E}">
-        <p14:creationId xmlns:p14="http://schemas.microsoft.com/office/powerpoint/2010/main" val="3522749986"/>
+        <p14:creationId xmlns:p14="http://schemas.microsoft.com/office/powerpoint/2010/main" val="636089087"/>
       </p:ext>
     </p:extLst>
   </p:cSld>
@@ -3446,50 +3653,14 @@
       </p:grpSpPr>
       <p:sp>
         <p:nvSpPr>
-          <p:cNvPr id="4" name="Title 3"/>
-          <p:cNvSpPr>
-            <a:spLocks noGrp="1"/>
-          </p:cNvSpPr>
-          <p:nvPr>
-            <p:ph type="title"/>
-          </p:nvPr>
-        </p:nvSpPr>
-        <p:spPr>
-          <a:xfrm>
-            <a:off x="172857" y="6180947"/>
-            <a:ext cx="8229600" cy="668073"/>
-          </a:xfrm>
-        </p:spPr>
-        <p:txBody>
-          <a:bodyPr>
-            <a:noAutofit/>
-          </a:bodyPr>
-          <a:lstStyle/>
-          <a:p>
-            <a:pPr algn="l"/>
-            <a:r>
-              <a:rPr lang="en-US" sz="1800">
-                <a:hlinkClick r:id="rId2"/>
-              </a:rPr>
-              <a:t>http://ropensci.org/</a:t>
-            </a:r>
-            <a:r>
-              <a:rPr lang="en-US" sz="1800"/>
-              <a:t> </a:t>
-            </a:r>
-          </a:p>
-        </p:txBody>
-      </p:sp>
-      <p:sp>
-        <p:nvSpPr>
           <p:cNvPr id="6" name="TextBox 5"/>
           <p:cNvSpPr txBox="1"/>
           <p:nvPr/>
         </p:nvSpPr>
         <p:spPr>
           <a:xfrm>
-            <a:off x="322714" y="44368"/>
-            <a:ext cx="1482723" cy="400110"/>
+            <a:off x="133152" y="244423"/>
+            <a:ext cx="5295139" cy="523220"/>
           </a:xfrm>
           <a:prstGeom prst="rect">
             <a:avLst/>
@@ -3503,22 +3674,22 @@
           <a:lstStyle/>
           <a:p>
             <a:r>
-              <a:rPr lang="en-US" sz="2000" b="1"/>
-              <a:t>The toolbelt</a:t>
+              <a:rPr lang="en-US" sz="2800" b="1"/>
+              <a:t>Data increasingly on the web</a:t>
             </a:r>
           </a:p>
         </p:txBody>
       </p:sp>
       <p:pic>
         <p:nvPicPr>
-          <p:cNvPr id="3" name="Picture 2" descr="ropensci_pkgs.png"/>
+          <p:cNvPr id="2" name="Picture 1" descr="data.png"/>
           <p:cNvPicPr>
             <a:picLocks noChangeAspect="1"/>
           </p:cNvPicPr>
           <p:nvPr/>
         </p:nvPicPr>
         <p:blipFill>
-          <a:blip r:embed="rId3">
+          <a:blip r:embed="rId2">
             <a:extLst>
               <a:ext uri="{28A0092B-C50C-407E-A947-70E740481C1C}">
                 <a14:useLocalDpi xmlns:a14="http://schemas.microsoft.com/office/drawing/2010/main" val="0"/>
@@ -3531,8 +3702,8 @@
         </p:blipFill>
         <p:spPr>
           <a:xfrm>
-            <a:off x="93692" y="688798"/>
-            <a:ext cx="9008668" cy="5044854"/>
+            <a:off x="525255" y="767659"/>
+            <a:ext cx="7905636" cy="5929227"/>
           </a:xfrm>
           <a:prstGeom prst="rect">
             <a:avLst/>
@@ -3542,7 +3713,7 @@
     </p:spTree>
     <p:extLst>
       <p:ext uri="{BB962C8B-B14F-4D97-AF65-F5344CB8AC3E}">
-        <p14:creationId xmlns:p14="http://schemas.microsoft.com/office/powerpoint/2010/main" val="4177996883"/>
+        <p14:creationId xmlns:p14="http://schemas.microsoft.com/office/powerpoint/2010/main" val="2813685723"/>
       </p:ext>
     </p:extLst>
   </p:cSld>
@@ -3577,8 +3748,8 @@
         </p:nvSpPr>
         <p:spPr>
           <a:xfrm>
-            <a:off x="322714" y="44368"/>
-            <a:ext cx="1238766" cy="400110"/>
+            <a:off x="172857" y="300832"/>
+            <a:ext cx="2291062" cy="523220"/>
           </a:xfrm>
           <a:prstGeom prst="rect">
             <a:avLst/>
@@ -3592,46 +3763,43 @@
           <a:lstStyle/>
           <a:p>
             <a:r>
-              <a:rPr lang="en-US" sz="2000" b="1"/>
-              <a:t>Literature</a:t>
+              <a:rPr lang="en-US" sz="2800" b="1"/>
+              <a:t>The toolbelt</a:t>
             </a:r>
           </a:p>
         </p:txBody>
       </p:sp>
       <p:pic>
         <p:nvPicPr>
-          <p:cNvPr id="7" name="Picture 6" descr="ropensci_lit.png"/>
+          <p:cNvPr id="5" name="Picture 4"/>
           <p:cNvPicPr>
             <a:picLocks noChangeAspect="1"/>
           </p:cNvPicPr>
           <p:nvPr/>
         </p:nvPicPr>
         <p:blipFill>
-          <a:blip r:embed="rId2">
-            <a:extLst>
-              <a:ext uri="{28A0092B-C50C-407E-A947-70E740481C1C}">
-                <a14:useLocalDpi xmlns:a14="http://schemas.microsoft.com/office/drawing/2010/main" val="0"/>
-              </a:ext>
-            </a:extLst>
-          </a:blip>
+          <a:blip r:embed="rId2"/>
           <a:stretch>
             <a:fillRect/>
           </a:stretch>
         </p:blipFill>
         <p:spPr>
           <a:xfrm>
-            <a:off x="149646" y="433462"/>
-            <a:ext cx="8792658" cy="6280470"/>
+            <a:off x="630117" y="1925565"/>
+            <a:ext cx="7646910" cy="3015503"/>
           </a:xfrm>
           <a:prstGeom prst="rect">
             <a:avLst/>
           </a:prstGeom>
+          <a:solidFill>
+            <a:schemeClr val="tx1"/>
+          </a:solidFill>
         </p:spPr>
       </p:pic>
     </p:spTree>
     <p:extLst>
       <p:ext uri="{BB962C8B-B14F-4D97-AF65-F5344CB8AC3E}">
-        <p14:creationId xmlns:p14="http://schemas.microsoft.com/office/powerpoint/2010/main" val="2557383426"/>
+        <p14:creationId xmlns:p14="http://schemas.microsoft.com/office/powerpoint/2010/main" val="4177996883"/>
       </p:ext>
     </p:extLst>
   </p:cSld>
@@ -3660,189 +3828,36 @@
       </p:grpSpPr>
       <p:sp>
         <p:nvSpPr>
-          <p:cNvPr id="3" name="Content Placeholder 2"/>
-          <p:cNvSpPr>
-            <a:spLocks noGrp="1"/>
-          </p:cNvSpPr>
-          <p:nvPr>
-            <p:ph idx="1"/>
-          </p:nvPr>
-        </p:nvSpPr>
-        <p:spPr>
-          <a:xfrm>
-            <a:off x="296073" y="255888"/>
-            <a:ext cx="8229600" cy="6188665"/>
-          </a:xfrm>
-        </p:spPr>
-        <p:txBody>
-          <a:bodyPr>
-            <a:normAutofit fontScale="55000" lnSpcReduction="20000"/>
+          <p:cNvPr id="6" name="TextBox 5"/>
+          <p:cNvSpPr txBox="1"/>
+          <p:nvPr/>
+        </p:nvSpPr>
+        <p:spPr>
+          <a:xfrm>
+            <a:off x="322714" y="244423"/>
+            <a:ext cx="1958288" cy="523220"/>
+          </a:xfrm>
+          <a:prstGeom prst="rect">
+            <a:avLst/>
+          </a:prstGeom>
+          <a:noFill/>
+        </p:spPr>
+        <p:txBody>
+          <a:bodyPr wrap="none" rtlCol="0">
+            <a:spAutoFit/>
           </a:bodyPr>
           <a:lstStyle/>
           <a:p>
-            <a:pPr marL="0" indent="0">
-              <a:buNone/>
-            </a:pPr>
-            <a:r>
-              <a:rPr lang="en-US" b="1"/>
-              <a:t>Make an API call</a:t>
-            </a:r>
-          </a:p>
-          <a:p>
-            <a:pPr marL="0" indent="0">
-              <a:buNone/>
-            </a:pPr>
-            <a:r>
-              <a:rPr lang="en-US"/>
-              <a:t>library(RCurl); library(RJSONIO)</a:t>
-            </a:r>
-          </a:p>
-          <a:p>
-            <a:pPr marL="0" indent="0">
-              <a:buNone/>
-            </a:pPr>
-            <a:r>
-              <a:rPr lang="en-US"/>
-              <a:t>dat &lt;- fromJSON(getURL("https://api.github.com/users/hadley/repos"))</a:t>
-            </a:r>
-          </a:p>
-          <a:p>
-            <a:pPr marL="0" indent="0">
-              <a:buNone/>
-            </a:pPr>
-            <a:endParaRPr lang="en-US"/>
-          </a:p>
-          <a:p>
-            <a:pPr marL="0" indent="0">
-              <a:buNone/>
-            </a:pPr>
-            <a:r>
-              <a:rPr lang="en-US" b="1"/>
-              <a:t>Manipulate the data</a:t>
-            </a:r>
-          </a:p>
-          <a:p>
-            <a:pPr marL="0" indent="0">
-              <a:buNone/>
-            </a:pPr>
-            <a:r>
-              <a:rPr lang="en-US"/>
-              <a:t>library(plyr); library(reshape2)</a:t>
-            </a:r>
-          </a:p>
-          <a:p>
-            <a:pPr marL="0" indent="0">
-              <a:buNone/>
-            </a:pPr>
-            <a:r>
-              <a:rPr lang="en-US"/>
-              <a:t>dat_melt &lt;- melt(ldply(dat, function(x) data.frame(x[names(x) %in% 			c("name","watchers_count","forks")])))</a:t>
-            </a:r>
-          </a:p>
-          <a:p>
-            <a:pPr marL="0" indent="0">
-              <a:buNone/>
-            </a:pPr>
-            <a:endParaRPr lang="en-US"/>
-          </a:p>
-          <a:p>
-            <a:pPr marL="0" indent="0">
-              <a:buNone/>
-            </a:pPr>
-            <a:r>
-              <a:rPr lang="en-US" b="1"/>
-              <a:t>Run some statistical model</a:t>
-            </a:r>
-          </a:p>
-          <a:p>
-            <a:pPr marL="0" indent="0">
-              <a:buNone/>
-            </a:pPr>
-            <a:r>
-              <a:rPr lang="en-US"/>
-              <a:t>lm(value ~ variable, data = dat_melt)</a:t>
-            </a:r>
-          </a:p>
-          <a:p>
-            <a:pPr marL="0" indent="0">
-              <a:buNone/>
-            </a:pPr>
-            <a:endParaRPr lang="en-US"/>
-          </a:p>
-          <a:p>
-            <a:pPr marL="0" indent="0">
-              <a:buNone/>
-            </a:pPr>
-            <a:r>
-              <a:rPr lang="en-US" b="1"/>
-              <a:t>Visualize results</a:t>
-            </a:r>
-          </a:p>
-          <a:p>
-            <a:pPr marL="0" indent="0">
-              <a:buNone/>
-            </a:pPr>
-            <a:r>
-              <a:rPr lang="en-US"/>
-              <a:t>library(ggplot2)</a:t>
-            </a:r>
-          </a:p>
-          <a:p>
-            <a:pPr marL="0" indent="0">
-              <a:buNone/>
-            </a:pPr>
-            <a:r>
-              <a:rPr lang="en-US"/>
-              <a:t>ggplot(dat_melt, aes(name, value, colour = variable)) + </a:t>
-            </a:r>
-          </a:p>
-          <a:p>
-            <a:pPr marL="0" indent="0">
-              <a:buNone/>
-            </a:pPr>
-            <a:r>
-              <a:rPr lang="en-US"/>
-              <a:t>	geom_point() + </a:t>
-            </a:r>
-          </a:p>
-          <a:p>
-            <a:pPr marL="0" indent="0">
-              <a:buNone/>
-            </a:pPr>
-            <a:r>
-              <a:rPr lang="en-US"/>
-              <a:t>	coord_flip()</a:t>
-            </a:r>
-          </a:p>
-          <a:p>
-            <a:pPr marL="0" indent="0">
-              <a:buNone/>
-            </a:pPr>
-            <a:endParaRPr lang="en-US"/>
-          </a:p>
-          <a:p>
-            <a:pPr marL="0" indent="0">
-              <a:buNone/>
-            </a:pPr>
-            <a:r>
-              <a:rPr lang="en-US" b="1"/>
-              <a:t>Write the paper</a:t>
-            </a:r>
-          </a:p>
-          <a:p>
-            <a:pPr marL="0" indent="0">
-              <a:buNone/>
-            </a:pPr>
-            <a:r>
-              <a:rPr lang="en-US"/>
-              <a:t># Introduction...</a:t>
+            <a:r>
+              <a:rPr lang="en-US" sz="2800" b="1"/>
+              <a:t>Literature</a:t>
             </a:r>
           </a:p>
         </p:txBody>
       </p:sp>
       <p:pic>
         <p:nvPicPr>
-          <p:cNvPr id="4" name="Picture 3"/>
+          <p:cNvPr id="2" name="Picture 1"/>
           <p:cNvPicPr>
             <a:picLocks noChangeAspect="1"/>
           </p:cNvPicPr>
@@ -3856,18 +3871,196 @@
         </p:blipFill>
         <p:spPr>
           <a:xfrm>
-            <a:off x="4570048" y="4386871"/>
-            <a:ext cx="4040928" cy="2291061"/>
+            <a:off x="1410192" y="1783797"/>
+            <a:ext cx="7444198" cy="4935151"/>
           </a:xfrm>
           <a:prstGeom prst="rect">
             <a:avLst/>
           </a:prstGeom>
         </p:spPr>
       </p:pic>
+      <p:sp>
+        <p:nvSpPr>
+          <p:cNvPr id="8" name="Content Placeholder 2"/>
+          <p:cNvSpPr txBox="1">
+            <a:spLocks/>
+          </p:cNvSpPr>
+          <p:nvPr/>
+        </p:nvSpPr>
+        <p:spPr>
+          <a:xfrm>
+            <a:off x="457200" y="785154"/>
+            <a:ext cx="8229600" cy="2056947"/>
+          </a:xfrm>
+          <a:prstGeom prst="rect">
+            <a:avLst/>
+          </a:prstGeom>
+        </p:spPr>
+        <p:txBody>
+          <a:bodyPr>
+            <a:normAutofit/>
+          </a:bodyPr>
+          <a:lstStyle>
+            <a:lvl1pPr marL="342900" indent="-342900" algn="l" defTabSz="914400" rtl="0" eaLnBrk="1" latinLnBrk="0" hangingPunct="1">
+              <a:spcBef>
+                <a:spcPct val="20000"/>
+              </a:spcBef>
+              <a:buFont typeface="Arial" pitchFamily="34" charset="0"/>
+              <a:buChar char="•"/>
+              <a:defRPr sz="3200" kern="1200">
+                <a:solidFill>
+                  <a:schemeClr val="tx1"/>
+                </a:solidFill>
+                <a:latin typeface="+mn-lt"/>
+                <a:ea typeface="+mn-ea"/>
+                <a:cs typeface="+mn-cs"/>
+              </a:defRPr>
+            </a:lvl1pPr>
+            <a:lvl2pPr marL="742950" indent="-285750" algn="l" defTabSz="914400" rtl="0" eaLnBrk="1" latinLnBrk="0" hangingPunct="1">
+              <a:spcBef>
+                <a:spcPct val="20000"/>
+              </a:spcBef>
+              <a:buFont typeface="Arial" pitchFamily="34" charset="0"/>
+              <a:buChar char="–"/>
+              <a:defRPr sz="2800" kern="1200">
+                <a:solidFill>
+                  <a:schemeClr val="tx1"/>
+                </a:solidFill>
+                <a:latin typeface="+mn-lt"/>
+                <a:ea typeface="+mn-ea"/>
+                <a:cs typeface="+mn-cs"/>
+              </a:defRPr>
+            </a:lvl2pPr>
+            <a:lvl3pPr marL="1143000" indent="-228600" algn="l" defTabSz="914400" rtl="0" eaLnBrk="1" latinLnBrk="0" hangingPunct="1">
+              <a:spcBef>
+                <a:spcPct val="20000"/>
+              </a:spcBef>
+              <a:buFont typeface="Arial" pitchFamily="34" charset="0"/>
+              <a:buChar char="•"/>
+              <a:defRPr sz="2400" kern="1200">
+                <a:solidFill>
+                  <a:schemeClr val="tx1"/>
+                </a:solidFill>
+                <a:latin typeface="+mn-lt"/>
+                <a:ea typeface="+mn-ea"/>
+                <a:cs typeface="+mn-cs"/>
+              </a:defRPr>
+            </a:lvl3pPr>
+            <a:lvl4pPr marL="1600200" indent="-228600" algn="l" defTabSz="914400" rtl="0" eaLnBrk="1" latinLnBrk="0" hangingPunct="1">
+              <a:spcBef>
+                <a:spcPct val="20000"/>
+              </a:spcBef>
+              <a:buFont typeface="Arial" pitchFamily="34" charset="0"/>
+              <a:buChar char="–"/>
+              <a:defRPr sz="2000" kern="1200">
+                <a:solidFill>
+                  <a:schemeClr val="tx1"/>
+                </a:solidFill>
+                <a:latin typeface="+mn-lt"/>
+                <a:ea typeface="+mn-ea"/>
+                <a:cs typeface="+mn-cs"/>
+              </a:defRPr>
+            </a:lvl4pPr>
+            <a:lvl5pPr marL="2057400" indent="-228600" algn="l" defTabSz="914400" rtl="0" eaLnBrk="1" latinLnBrk="0" hangingPunct="1">
+              <a:spcBef>
+                <a:spcPct val="20000"/>
+              </a:spcBef>
+              <a:buFont typeface="Arial" pitchFamily="34" charset="0"/>
+              <a:buChar char="»"/>
+              <a:defRPr sz="2000" kern="1200">
+                <a:solidFill>
+                  <a:schemeClr val="tx1"/>
+                </a:solidFill>
+                <a:latin typeface="+mn-lt"/>
+                <a:ea typeface="+mn-ea"/>
+                <a:cs typeface="+mn-cs"/>
+              </a:defRPr>
+            </a:lvl5pPr>
+            <a:lvl6pPr marL="2514600" indent="-228600" algn="l" defTabSz="914400" rtl="0" eaLnBrk="1" latinLnBrk="0" hangingPunct="1">
+              <a:spcBef>
+                <a:spcPct val="20000"/>
+              </a:spcBef>
+              <a:buFont typeface="Arial" pitchFamily="34" charset="0"/>
+              <a:buChar char="•"/>
+              <a:defRPr sz="2000" kern="1200">
+                <a:solidFill>
+                  <a:schemeClr val="tx1"/>
+                </a:solidFill>
+                <a:latin typeface="+mn-lt"/>
+                <a:ea typeface="+mn-ea"/>
+                <a:cs typeface="+mn-cs"/>
+              </a:defRPr>
+            </a:lvl6pPr>
+            <a:lvl7pPr marL="2971800" indent="-228600" algn="l" defTabSz="914400" rtl="0" eaLnBrk="1" latinLnBrk="0" hangingPunct="1">
+              <a:spcBef>
+                <a:spcPct val="20000"/>
+              </a:spcBef>
+              <a:buFont typeface="Arial" pitchFamily="34" charset="0"/>
+              <a:buChar char="•"/>
+              <a:defRPr sz="2000" kern="1200">
+                <a:solidFill>
+                  <a:schemeClr val="tx1"/>
+                </a:solidFill>
+                <a:latin typeface="+mn-lt"/>
+                <a:ea typeface="+mn-ea"/>
+                <a:cs typeface="+mn-cs"/>
+              </a:defRPr>
+            </a:lvl7pPr>
+            <a:lvl8pPr marL="3429000" indent="-228600" algn="l" defTabSz="914400" rtl="0" eaLnBrk="1" latinLnBrk="0" hangingPunct="1">
+              <a:spcBef>
+                <a:spcPct val="20000"/>
+              </a:spcBef>
+              <a:buFont typeface="Arial" pitchFamily="34" charset="0"/>
+              <a:buChar char="•"/>
+              <a:defRPr sz="2000" kern="1200">
+                <a:solidFill>
+                  <a:schemeClr val="tx1"/>
+                </a:solidFill>
+                <a:latin typeface="+mn-lt"/>
+                <a:ea typeface="+mn-ea"/>
+                <a:cs typeface="+mn-cs"/>
+              </a:defRPr>
+            </a:lvl8pPr>
+            <a:lvl9pPr marL="3886200" indent="-228600" algn="l" defTabSz="914400" rtl="0" eaLnBrk="1" latinLnBrk="0" hangingPunct="1">
+              <a:spcBef>
+                <a:spcPct val="20000"/>
+              </a:spcBef>
+              <a:buFont typeface="Arial" pitchFamily="34" charset="0"/>
+              <a:buChar char="•"/>
+              <a:defRPr sz="2000" kern="1200">
+                <a:solidFill>
+                  <a:schemeClr val="tx1"/>
+                </a:solidFill>
+                <a:latin typeface="+mn-lt"/>
+                <a:ea typeface="+mn-ea"/>
+                <a:cs typeface="+mn-cs"/>
+              </a:defRPr>
+            </a:lvl9pPr>
+          </a:lstStyle>
+          <a:p>
+            <a:pPr marL="0" indent="0">
+              <a:buNone/>
+            </a:pPr>
+            <a:r>
+              <a:rPr lang="en-US" sz="2000"/>
+              <a:t>library(rplos)</a:t>
+            </a:r>
+          </a:p>
+          <a:p>
+            <a:pPr marL="0" indent="0">
+              <a:buNone/>
+            </a:pPr>
+            <a:r>
+              <a:rPr lang="en-US" sz="2000"/>
+              <a:t>plot_throughtime('phylogeny', 300) + geom_line(size=2)</a:t>
+            </a:r>
+          </a:p>
+        </p:txBody>
+      </p:sp>
     </p:spTree>
     <p:extLst>
       <p:ext uri="{BB962C8B-B14F-4D97-AF65-F5344CB8AC3E}">
-        <p14:creationId xmlns:p14="http://schemas.microsoft.com/office/powerpoint/2010/main" val="636089087"/>
+        <p14:creationId xmlns:p14="http://schemas.microsoft.com/office/powerpoint/2010/main" val="2557383426"/>
       </p:ext>
     </p:extLst>
   </p:cSld>
@@ -3902,8 +4095,8 @@
         </p:nvSpPr>
         <p:spPr>
           <a:xfrm>
-            <a:off x="322714" y="44368"/>
-            <a:ext cx="1299630" cy="400110"/>
+            <a:off x="218455" y="244423"/>
+            <a:ext cx="2018501" cy="523220"/>
           </a:xfrm>
           <a:prstGeom prst="rect">
             <a:avLst/>
@@ -3917,7 +4110,7 @@
           <a:lstStyle/>
           <a:p>
             <a:r>
-              <a:rPr lang="en-US" sz="2000" b="1"/>
+              <a:rPr lang="en-US" sz="2800" b="1"/>
               <a:t>Taxonomy</a:t>
             </a:r>
           </a:p>
@@ -3959,16 +4152,7 @@
             </a:pPr>
             <a:r>
               <a:rPr lang="en-US" sz="2000"/>
-              <a:t>specieslist &lt;- "Abies procera"</a:t>
-            </a:r>
-          </a:p>
-          <a:p>
-            <a:pPr marL="0" indent="0">
-              <a:buNone/>
-            </a:pPr>
-            <a:r>
-              <a:rPr lang="en-US" sz="2000"/>
-              <a:t>classification(specieslist, db = "itis")</a:t>
+              <a:t>classification("Abies procera",  db = "itis")</a:t>
             </a:r>
           </a:p>
           <a:p>
@@ -4902,8 +5086,8 @@
         </p:nvSpPr>
         <p:spPr>
           <a:xfrm>
-            <a:off x="322714" y="44368"/>
-            <a:ext cx="1299630" cy="400110"/>
+            <a:off x="162176" y="327053"/>
+            <a:ext cx="5769929" cy="523220"/>
           </a:xfrm>
           <a:prstGeom prst="rect">
             <a:avLst/>
@@ -4917,8 +5101,8 @@
           <a:lstStyle/>
           <a:p>
             <a:r>
-              <a:rPr lang="en-US" sz="2000" b="1"/>
-              <a:t>Taxonomy</a:t>
+              <a:rPr lang="en-US" sz="2800" b="1"/>
+              <a:t>Species occurrences from GBIF</a:t>
             </a:r>
           </a:p>
         </p:txBody>
@@ -4935,7 +5119,7 @@
         </p:nvSpPr>
         <p:spPr>
           <a:xfrm>
-            <a:off x="457200" y="556120"/>
+            <a:off x="457200" y="859393"/>
             <a:ext cx="8229600" cy="2056947"/>
           </a:xfrm>
         </p:spPr>
@@ -4968,7 +5152,7 @@
             </a:pPr>
             <a:r>
               <a:rPr lang="en-US" sz="1600"/>
-              <a:t>out &lt;- occurrencelist_many(splist, coordinatestatus = TRUE, maxresults = 40)</a:t>
+              <a:t>out &lt;- occurrencelist_many(splist)</a:t>
             </a:r>
           </a:p>
           <a:p>
@@ -4984,7 +5168,7 @@
       </p:sp>
       <p:pic>
         <p:nvPicPr>
-          <p:cNvPr id="2" name="Picture 1"/>
+          <p:cNvPr id="4" name="Picture 3"/>
           <p:cNvPicPr>
             <a:picLocks noChangeAspect="1"/>
           </p:cNvPicPr>
@@ -4998,8 +5182,8 @@
         </p:blipFill>
         <p:spPr>
           <a:xfrm>
-            <a:off x="895272" y="2259104"/>
-            <a:ext cx="7660910" cy="4414107"/>
+            <a:off x="878473" y="2220195"/>
+            <a:ext cx="7646000" cy="4566494"/>
           </a:xfrm>
           <a:prstGeom prst="rect">
             <a:avLst/>
@@ -5044,8 +5228,8 @@
         </p:nvSpPr>
         <p:spPr>
           <a:xfrm>
-            <a:off x="322714" y="44368"/>
-            <a:ext cx="1299630" cy="400110"/>
+            <a:off x="85761" y="357118"/>
+            <a:ext cx="7211480" cy="523220"/>
           </a:xfrm>
           <a:prstGeom prst="rect">
             <a:avLst/>
@@ -5059,8 +5243,8 @@
           <a:lstStyle/>
           <a:p>
             <a:r>
-              <a:rPr lang="en-US" sz="2000" b="1"/>
-              <a:t>Taxonomy</a:t>
+              <a:rPr lang="en-US" sz="2800" b="1"/>
+              <a:t>Occurrence from USGS’s BISON service </a:t>
             </a:r>
           </a:p>
         </p:txBody>
@@ -5077,7 +5261,7 @@
         </p:nvSpPr>
         <p:spPr>
           <a:xfrm>
-            <a:off x="322714" y="587352"/>
+            <a:off x="234683" y="852716"/>
             <a:ext cx="8364086" cy="2056947"/>
           </a:xfrm>
         </p:spPr>
@@ -5131,8 +5315,8 @@
         </p:blipFill>
         <p:spPr>
           <a:xfrm>
-            <a:off x="472359" y="2029929"/>
-            <a:ext cx="8126410" cy="4682321"/>
+            <a:off x="765321" y="2103957"/>
+            <a:ext cx="7833447" cy="4513520"/>
           </a:xfrm>
           <a:prstGeom prst="rect">
             <a:avLst/>
@@ -5177,8 +5361,8 @@
         </p:nvSpPr>
         <p:spPr>
           <a:xfrm>
-            <a:off x="322714" y="244423"/>
-            <a:ext cx="1737825" cy="400110"/>
+            <a:off x="85761" y="357118"/>
+            <a:ext cx="6150918" cy="523220"/>
           </a:xfrm>
           <a:prstGeom prst="rect">
             <a:avLst/>
@@ -5192,148 +5376,143 @@
           <a:lstStyle/>
           <a:p>
             <a:r>
-              <a:rPr lang="en-US" sz="2000" b="1"/>
-              <a:t>Take action!</a:t>
-            </a:r>
-          </a:p>
-        </p:txBody>
-      </p:sp>
-      <p:sp>
-        <p:nvSpPr>
-          <p:cNvPr id="2" name="TextBox 1"/>
-          <p:cNvSpPr txBox="1"/>
-          <p:nvPr/>
-        </p:nvSpPr>
-        <p:spPr>
-          <a:xfrm>
-            <a:off x="322714" y="6084417"/>
-            <a:ext cx="7651441" cy="646331"/>
-          </a:xfrm>
-          <a:prstGeom prst="rect">
-            <a:avLst/>
-          </a:prstGeom>
-          <a:noFill/>
-        </p:spPr>
-        <p:txBody>
-          <a:bodyPr wrap="none" rtlCol="0">
-            <a:spAutoFit/>
+              <a:rPr lang="en-US" sz="2800" b="1"/>
+              <a:t>Climate data from the World Bank</a:t>
+            </a:r>
+          </a:p>
+        </p:txBody>
+      </p:sp>
+      <p:sp>
+        <p:nvSpPr>
+          <p:cNvPr id="3" name="Content Placeholder 2"/>
+          <p:cNvSpPr>
+            <a:spLocks noGrp="1"/>
+          </p:cNvSpPr>
+          <p:nvPr>
+            <p:ph idx="1"/>
+          </p:nvPr>
+        </p:nvSpPr>
+        <p:spPr>
+          <a:xfrm>
+            <a:off x="234683" y="852716"/>
+            <a:ext cx="8364086" cy="3260425"/>
+          </a:xfrm>
+        </p:spPr>
+        <p:txBody>
+          <a:bodyPr>
+            <a:normAutofit lnSpcReduction="10000"/>
           </a:bodyPr>
           <a:lstStyle/>
           <a:p>
-            <a:r>
-              <a:rPr lang="en-US"/>
-              <a:t>FontAwesome </a:t>
-            </a:r>
-            <a:r>
-              <a:rPr lang="en-US">
-                <a:hlinkClick r:id="rId2"/>
-              </a:rPr>
-              <a:t>http://fortawesome.github.io/Font-Awesome/</a:t>
-            </a:r>
-            <a:endParaRPr lang="en-US"/>
-          </a:p>
-          <a:p>
-            <a:r>
-              <a:rPr lang="en-US"/>
-              <a:t>fontawesome 2 png </a:t>
-            </a:r>
-            <a:r>
-              <a:rPr lang="en-US">
-                <a:hlinkClick r:id="rId3"/>
-              </a:rPr>
-              <a:t>https://github.com/odyniec/font-awesome-to-png</a:t>
-            </a:r>
-            <a:r>
-              <a:rPr lang="en-US"/>
-              <a:t> </a:t>
+            <a:pPr marL="0" indent="0">
+              <a:buNone/>
+            </a:pPr>
+            <a:r>
+              <a:rPr lang="en-US" sz="1800"/>
+              <a:t>library(rWBclimate)</a:t>
+            </a:r>
+          </a:p>
+          <a:p>
+            <a:pPr marL="0" indent="0">
+              <a:buNone/>
+            </a:pPr>
+            <a:r>
+              <a:rPr lang="en-US" sz="1800"/>
+              <a:t>country.list &lt;- c("USA", "MEX")</a:t>
+            </a:r>
+          </a:p>
+          <a:p>
+            <a:pPr marL="0" indent="0">
+              <a:buNone/>
+            </a:pPr>
+            <a:r>
+              <a:rPr lang="en-US" sz="1800"/>
+              <a:t>country.dat &lt;- get_historical_temp(country.list, "year")</a:t>
+            </a:r>
+          </a:p>
+          <a:p>
+            <a:pPr marL="0" indent="0">
+              <a:buNone/>
+            </a:pPr>
+            <a:r>
+              <a:rPr lang="en-US" sz="1800"/>
+              <a:t>ggplot(country.dat, aes(x = year, y = data, group = locator)) + </a:t>
+            </a:r>
+          </a:p>
+          <a:p>
+            <a:pPr marL="0" indent="0">
+              <a:buNone/>
+            </a:pPr>
+            <a:r>
+              <a:rPr lang="en-US" sz="1800"/>
+              <a:t>  geom_point() + </a:t>
+            </a:r>
+          </a:p>
+          <a:p>
+            <a:pPr marL="0" indent="0">
+              <a:buNone/>
+            </a:pPr>
+            <a:r>
+              <a:rPr lang="en-US" sz="1800"/>
+              <a:t>  geom_path() + </a:t>
+            </a:r>
+          </a:p>
+          <a:p>
+            <a:pPr marL="0" indent="0">
+              <a:buNone/>
+            </a:pPr>
+            <a:r>
+              <a:rPr lang="en-US" sz="1800"/>
+              <a:t>  labs(y="Average annual temperature of Canada", x="Year") +</a:t>
+            </a:r>
+          </a:p>
+          <a:p>
+            <a:pPr marL="0" indent="0">
+              <a:buNone/>
+            </a:pPr>
+            <a:r>
+              <a:rPr lang="en-US" sz="1800"/>
+              <a:t>  theme_bw() +</a:t>
+            </a:r>
+          </a:p>
+          <a:p>
+            <a:pPr marL="0" indent="0">
+              <a:buNone/>
+            </a:pPr>
+            <a:r>
+              <a:rPr lang="en-US" sz="1800"/>
+              <a:t>  stat_smooth(se = F, colour = "black") + </a:t>
+            </a:r>
+          </a:p>
+          <a:p>
+            <a:pPr marL="0" indent="0">
+              <a:buNone/>
+            </a:pPr>
+            <a:r>
+              <a:rPr lang="en-US" sz="1800"/>
+              <a:t>  facet_wrap(~locator, scale = "free")</a:t>
             </a:r>
           </a:p>
         </p:txBody>
       </p:sp>
       <p:pic>
         <p:nvPicPr>
-          <p:cNvPr id="5" name="Picture 4" descr="question.png"/>
+          <p:cNvPr id="5" name="Picture 4"/>
           <p:cNvPicPr>
             <a:picLocks noChangeAspect="1"/>
           </p:cNvPicPr>
           <p:nvPr/>
         </p:nvPicPr>
         <p:blipFill>
-          <a:blip r:embed="rId4">
-            <a:extLst>
-              <a:ext uri="{28A0092B-C50C-407E-A947-70E740481C1C}">
-                <a14:useLocalDpi xmlns:a14="http://schemas.microsoft.com/office/drawing/2010/main" val="0"/>
-              </a:ext>
-            </a:extLst>
-          </a:blip>
+          <a:blip r:embed="rId2"/>
           <a:stretch>
             <a:fillRect/>
           </a:stretch>
         </p:blipFill>
         <p:spPr>
           <a:xfrm>
-            <a:off x="6639605" y="2069690"/>
-            <a:ext cx="1524000" cy="1524000"/>
-          </a:xfrm>
-          <a:prstGeom prst="rect">
-            <a:avLst/>
-          </a:prstGeom>
-        </p:spPr>
-      </p:pic>
-      <p:pic>
-        <p:nvPicPr>
-          <p:cNvPr id="7" name="Picture 6" descr="unlock.png"/>
-          <p:cNvPicPr>
-            <a:picLocks noChangeAspect="1"/>
-          </p:cNvPicPr>
-          <p:nvPr/>
-        </p:nvPicPr>
-        <p:blipFill>
-          <a:blip r:embed="rId5">
-            <a:extLst>
-              <a:ext uri="{28A0092B-C50C-407E-A947-70E740481C1C}">
-                <a14:useLocalDpi xmlns:a14="http://schemas.microsoft.com/office/drawing/2010/main" val="0"/>
-              </a:ext>
-            </a:extLst>
-          </a:blip>
-          <a:stretch>
-            <a:fillRect/>
-          </a:stretch>
-        </p:blipFill>
-        <p:spPr>
-          <a:xfrm>
-            <a:off x="1298539" y="2069690"/>
-            <a:ext cx="1524000" cy="1524000"/>
-          </a:xfrm>
-          <a:prstGeom prst="rect">
-            <a:avLst/>
-          </a:prstGeom>
-        </p:spPr>
-      </p:pic>
-      <p:pic>
-        <p:nvPicPr>
-          <p:cNvPr id="8" name="Picture 7" descr="wrench.png"/>
-          <p:cNvPicPr>
-            <a:picLocks noChangeAspect="1"/>
-          </p:cNvPicPr>
-          <p:nvPr/>
-        </p:nvPicPr>
-        <p:blipFill>
-          <a:blip r:embed="rId6">
-            <a:extLst>
-              <a:ext uri="{28A0092B-C50C-407E-A947-70E740481C1C}">
-                <a14:useLocalDpi xmlns:a14="http://schemas.microsoft.com/office/drawing/2010/main" val="0"/>
-              </a:ext>
-            </a:extLst>
-          </a:blip>
-          <a:stretch>
-            <a:fillRect/>
-          </a:stretch>
-        </p:blipFill>
-        <p:spPr>
-          <a:xfrm>
-            <a:off x="3870508" y="2069690"/>
-            <a:ext cx="1524000" cy="1524000"/>
+            <a:off x="3201846" y="3962873"/>
+            <a:ext cx="5659276" cy="2654773"/>
           </a:xfrm>
           <a:prstGeom prst="rect">
             <a:avLst/>
@@ -5343,7 +5522,7 @@
     </p:spTree>
     <p:extLst>
       <p:ext uri="{BB962C8B-B14F-4D97-AF65-F5344CB8AC3E}">
-        <p14:creationId xmlns:p14="http://schemas.microsoft.com/office/powerpoint/2010/main" val="2943983534"/>
+        <p14:creationId xmlns:p14="http://schemas.microsoft.com/office/powerpoint/2010/main" val="86610748"/>
       </p:ext>
     </p:extLst>
   </p:cSld>
@@ -5475,8 +5654,8 @@
         </p:nvSpPr>
         <p:spPr>
           <a:xfrm>
-            <a:off x="322714" y="328687"/>
-            <a:ext cx="1403073" cy="400110"/>
+            <a:off x="322714" y="244423"/>
+            <a:ext cx="3290985" cy="707886"/>
           </a:xfrm>
           <a:prstGeom prst="rect">
             <a:avLst/>
@@ -5490,68 +5669,174 @@
           <a:lstStyle/>
           <a:p>
             <a:r>
-              <a:rPr lang="en-US" sz="2000" b="1"/>
-              <a:t>The deets</a:t>
-            </a:r>
-          </a:p>
-        </p:txBody>
-      </p:sp>
-      <p:sp>
-        <p:nvSpPr>
-          <p:cNvPr id="3" name="Content Placeholder 2"/>
-          <p:cNvSpPr>
-            <a:spLocks noGrp="1"/>
-          </p:cNvSpPr>
-          <p:nvPr>
-            <p:ph idx="1"/>
-          </p:nvPr>
-        </p:nvSpPr>
-        <p:spPr/>
-        <p:txBody>
-          <a:bodyPr/>
+              <a:rPr lang="en-US" sz="4000" b="1"/>
+              <a:t>Take action!</a:t>
+            </a:r>
+          </a:p>
+        </p:txBody>
+      </p:sp>
+      <p:sp>
+        <p:nvSpPr>
+          <p:cNvPr id="2" name="TextBox 1"/>
+          <p:cNvSpPr txBox="1"/>
+          <p:nvPr/>
+        </p:nvSpPr>
+        <p:spPr>
+          <a:xfrm>
+            <a:off x="322714" y="5855383"/>
+            <a:ext cx="7614585" cy="923330"/>
+          </a:xfrm>
+          <a:prstGeom prst="rect">
+            <a:avLst/>
+          </a:prstGeom>
+          <a:noFill/>
+        </p:spPr>
+        <p:txBody>
+          <a:bodyPr wrap="none" rtlCol="0">
+            <a:spAutoFit/>
+          </a:bodyPr>
           <a:lstStyle/>
           <a:p>
             <a:r>
               <a:rPr lang="en-US"/>
-              <a:t>Presentation made using Slidify</a:t>
-            </a:r>
-          </a:p>
-          <a:p>
-            <a:pPr marL="0" indent="0">
-              <a:buNone/>
-            </a:pPr>
+              <a:t>FontAwesome </a:t>
+            </a:r>
+            <a:r>
+              <a:rPr lang="en-US">
+                <a:hlinkClick r:id="rId2"/>
+              </a:rPr>
+              <a:t>http://fortawesome.github.io/Font-Awesome/</a:t>
+            </a:r>
+            <a:endParaRPr lang="en-US"/>
+          </a:p>
+          <a:p>
             <a:r>
               <a:rPr lang="en-US"/>
-              <a:t>https://github.com/ramnathv/slidify</a:t>
-            </a:r>
-          </a:p>
-          <a:p>
-            <a:pPr marL="0" indent="0">
-              <a:buNone/>
-            </a:pPr>
-            <a:endParaRPr lang="en-US"/>
-          </a:p>
-          <a:p>
+              <a:t>fontawesome 2 png </a:t>
+            </a:r>
+            <a:r>
+              <a:rPr lang="en-US">
+                <a:hlinkClick r:id="rId3"/>
+              </a:rPr>
+              <a:t>https://github.com/odyniec/font-awesome-to-png</a:t>
+            </a:r>
             <a:r>
               <a:rPr lang="en-US"/>
-              <a:t>See it online here: </a:t>
-            </a:r>
-          </a:p>
-          <a:p>
-            <a:pPr marL="0" indent="0">
-              <a:buNone/>
-            </a:pPr>
+              <a:t> </a:t>
+            </a:r>
+          </a:p>
+          <a:p>
             <a:r>
               <a:rPr lang="en-US"/>
-              <a:t>linklink</a:t>
-            </a:r>
-          </a:p>
-        </p:txBody>
-      </p:sp>
+              <a:t>Presentation available here: </a:t>
+            </a:r>
+            <a:r>
+              <a:rPr lang="en-US">
+                <a:hlinkClick r:id="rId4"/>
+              </a:rPr>
+              <a:t>http://bit.ly/16tuVbu</a:t>
+            </a:r>
+            <a:r>
+              <a:rPr lang="en-US"/>
+              <a:t> </a:t>
+            </a:r>
+          </a:p>
+        </p:txBody>
+      </p:sp>
+      <p:pic>
+        <p:nvPicPr>
+          <p:cNvPr id="5" name="Picture 4" descr="question.png"/>
+          <p:cNvPicPr>
+            <a:picLocks noChangeAspect="1"/>
+          </p:cNvPicPr>
+          <p:nvPr/>
+        </p:nvPicPr>
+        <p:blipFill>
+          <a:blip r:embed="rId5">
+            <a:extLst>
+              <a:ext uri="{28A0092B-C50C-407E-A947-70E740481C1C}">
+                <a14:useLocalDpi xmlns:a14="http://schemas.microsoft.com/office/drawing/2010/main" val="0"/>
+              </a:ext>
+            </a:extLst>
+          </a:blip>
+          <a:stretch>
+            <a:fillRect/>
+          </a:stretch>
+        </p:blipFill>
+        <p:spPr>
+          <a:xfrm>
+            <a:off x="6639605" y="2069690"/>
+            <a:ext cx="1524000" cy="1524000"/>
+          </a:xfrm>
+          <a:prstGeom prst="rect">
+            <a:avLst/>
+          </a:prstGeom>
+        </p:spPr>
+      </p:pic>
+      <p:pic>
+        <p:nvPicPr>
+          <p:cNvPr id="7" name="Picture 6" descr="unlock.png"/>
+          <p:cNvPicPr>
+            <a:picLocks noChangeAspect="1"/>
+          </p:cNvPicPr>
+          <p:nvPr/>
+        </p:nvPicPr>
+        <p:blipFill>
+          <a:blip r:embed="rId6">
+            <a:extLst>
+              <a:ext uri="{28A0092B-C50C-407E-A947-70E740481C1C}">
+                <a14:useLocalDpi xmlns:a14="http://schemas.microsoft.com/office/drawing/2010/main" val="0"/>
+              </a:ext>
+            </a:extLst>
+          </a:blip>
+          <a:stretch>
+            <a:fillRect/>
+          </a:stretch>
+        </p:blipFill>
+        <p:spPr>
+          <a:xfrm>
+            <a:off x="1298539" y="2069690"/>
+            <a:ext cx="1524000" cy="1524000"/>
+          </a:xfrm>
+          <a:prstGeom prst="rect">
+            <a:avLst/>
+          </a:prstGeom>
+        </p:spPr>
+      </p:pic>
+      <p:pic>
+        <p:nvPicPr>
+          <p:cNvPr id="8" name="Picture 7" descr="wrench.png"/>
+          <p:cNvPicPr>
+            <a:picLocks noChangeAspect="1"/>
+          </p:cNvPicPr>
+          <p:nvPr/>
+        </p:nvPicPr>
+        <p:blipFill>
+          <a:blip r:embed="rId7">
+            <a:extLst>
+              <a:ext uri="{28A0092B-C50C-407E-A947-70E740481C1C}">
+                <a14:useLocalDpi xmlns:a14="http://schemas.microsoft.com/office/drawing/2010/main" val="0"/>
+              </a:ext>
+            </a:extLst>
+          </a:blip>
+          <a:stretch>
+            <a:fillRect/>
+          </a:stretch>
+        </p:blipFill>
+        <p:spPr>
+          <a:xfrm>
+            <a:off x="3870508" y="2069690"/>
+            <a:ext cx="1524000" cy="1524000"/>
+          </a:xfrm>
+          <a:prstGeom prst="rect">
+            <a:avLst/>
+          </a:prstGeom>
+        </p:spPr>
+      </p:pic>
     </p:spTree>
     <p:extLst>
       <p:ext uri="{BB962C8B-B14F-4D97-AF65-F5344CB8AC3E}">
-        <p14:creationId xmlns:p14="http://schemas.microsoft.com/office/powerpoint/2010/main" val="2112178401"/>
+        <p14:creationId xmlns:p14="http://schemas.microsoft.com/office/powerpoint/2010/main" val="2943983534"/>
       </p:ext>
     </p:extLst>
   </p:cSld>
@@ -5622,8 +5907,8 @@
         </p:nvSpPr>
         <p:spPr>
           <a:xfrm>
-            <a:off x="322714" y="44368"/>
-            <a:ext cx="4714276" cy="400110"/>
+            <a:off x="226628" y="163934"/>
+            <a:ext cx="6526120" cy="523220"/>
           </a:xfrm>
           <a:prstGeom prst="rect">
             <a:avLst/>
@@ -5637,7 +5922,7 @@
           <a:lstStyle/>
           <a:p>
             <a:r>
-              <a:rPr lang="en-US" sz="2000" b="1"/>
+              <a:rPr lang="en-US" sz="2800" b="1"/>
               <a:t>We build on the knowledge of others</a:t>
             </a:r>
           </a:p>
@@ -5717,8 +6002,8 @@
         </p:blipFill>
         <p:spPr>
           <a:xfrm>
-            <a:off x="93692" y="468478"/>
-            <a:ext cx="8776157" cy="5850771"/>
+            <a:off x="445471" y="702997"/>
+            <a:ext cx="8424378" cy="5616252"/>
           </a:xfrm>
           <a:prstGeom prst="rect">
             <a:avLst/>
@@ -5763,8 +6048,8 @@
         </p:nvSpPr>
         <p:spPr>
           <a:xfrm>
-            <a:off x="695418" y="1425821"/>
-            <a:ext cx="7791917" cy="3046988"/>
+            <a:off x="843601" y="1425821"/>
+            <a:ext cx="7495561" cy="3785652"/>
           </a:xfrm>
           <a:prstGeom prst="rect">
             <a:avLst/>
@@ -5795,7 +6080,14 @@
             <a:pPr algn="ctr"/>
             <a:r>
               <a:rPr lang="en-US" sz="4800" b="1"/>
-              <a:t>More fortiutious findings</a:t>
+              <a:t>More things can happen</a:t>
+            </a:r>
+          </a:p>
+          <a:p>
+            <a:pPr algn="ctr"/>
+            <a:r>
+              <a:rPr lang="en-US" sz="4800" b="1"/>
+              <a:t>b/c data is open</a:t>
             </a:r>
           </a:p>
         </p:txBody>
@@ -5874,7 +6166,7 @@
         </p:nvSpPr>
         <p:spPr>
           <a:xfrm>
-            <a:off x="322714" y="44368"/>
+            <a:off x="322714" y="244423"/>
             <a:ext cx="2906139" cy="400110"/>
           </a:xfrm>
           <a:prstGeom prst="rect">
@@ -6055,8 +6347,8 @@
         </p:blipFill>
         <p:spPr>
           <a:xfrm>
-            <a:off x="457200" y="553959"/>
-            <a:ext cx="8386137" cy="5557079"/>
+            <a:off x="635034" y="870481"/>
+            <a:ext cx="8123001" cy="5382712"/>
           </a:xfrm>
           <a:prstGeom prst="rect">
             <a:avLst/>
@@ -6071,8 +6363,8 @@
         </p:nvSpPr>
         <p:spPr>
           <a:xfrm>
-            <a:off x="322714" y="44368"/>
-            <a:ext cx="3358487" cy="400110"/>
+            <a:off x="229725" y="244423"/>
+            <a:ext cx="5162767" cy="523220"/>
           </a:xfrm>
           <a:prstGeom prst="rect">
             <a:avLst/>
@@ -6086,7 +6378,7 @@
           <a:lstStyle/>
           <a:p>
             <a:r>
-              <a:rPr lang="en-US" sz="2000" b="1"/>
+              <a:rPr lang="en-US" sz="2800" b="1"/>
               <a:t>But we need tools to do it!!!!!</a:t>
             </a:r>
           </a:p>
@@ -6130,8 +6422,8 @@
         </p:nvSpPr>
         <p:spPr>
           <a:xfrm>
-            <a:off x="322714" y="44368"/>
-            <a:ext cx="3474579" cy="400110"/>
+            <a:off x="218454" y="111757"/>
+            <a:ext cx="5483442" cy="523220"/>
           </a:xfrm>
           <a:prstGeom prst="rect">
             <a:avLst/>
@@ -6145,7 +6437,7 @@
           <a:lstStyle/>
           <a:p>
             <a:r>
-              <a:rPr lang="en-US" sz="2000" b="1"/>
+              <a:rPr lang="en-US" sz="2800" b="1"/>
               <a:t>What kinds of tools? Not these</a:t>
             </a:r>
           </a:p>
@@ -6173,8 +6465,8 @@
         </p:blipFill>
         <p:spPr>
           <a:xfrm>
-            <a:off x="558800" y="609339"/>
-            <a:ext cx="8128000" cy="6096000"/>
+            <a:off x="547369" y="634977"/>
+            <a:ext cx="7892999" cy="5919749"/>
           </a:xfrm>
           <a:prstGeom prst="rect">
             <a:avLst/>
@@ -6219,8 +6511,8 @@
         </p:nvSpPr>
         <p:spPr>
           <a:xfrm>
-            <a:off x="322714" y="44368"/>
-            <a:ext cx="1311026" cy="400110"/>
+            <a:off x="322714" y="244423"/>
+            <a:ext cx="2009484" cy="523220"/>
           </a:xfrm>
           <a:prstGeom prst="rect">
             <a:avLst/>
@@ -6234,7 +6526,7 @@
           <a:lstStyle/>
           <a:p>
             <a:r>
-              <a:rPr lang="en-US" sz="2000" b="1"/>
+              <a:rPr lang="en-US" sz="2800" b="1"/>
               <a:t>These!!!!!!</a:t>
             </a:r>
           </a:p>
@@ -6262,8 +6554,8 @@
         </p:blipFill>
         <p:spPr>
           <a:xfrm>
-            <a:off x="520506" y="603817"/>
-            <a:ext cx="8128000" cy="6096000"/>
+            <a:off x="656798" y="871909"/>
+            <a:ext cx="7669452" cy="5752089"/>
           </a:xfrm>
           <a:prstGeom prst="rect">
             <a:avLst/>
@@ -6354,8 +6646,8 @@
         </p:nvSpPr>
         <p:spPr>
           <a:xfrm>
-            <a:off x="322714" y="44368"/>
-            <a:ext cx="3118787" cy="400110"/>
+            <a:off x="322714" y="366596"/>
+            <a:ext cx="7000684" cy="707886"/>
           </a:xfrm>
           <a:prstGeom prst="rect">
             <a:avLst/>
@@ -6369,7 +6661,7 @@
           <a:lstStyle/>
           <a:p>
             <a:r>
-              <a:rPr lang="en-US" sz="2000" b="1"/>
+              <a:rPr lang="en-US" sz="4000" b="1"/>
               <a:t>What does an ecologist do?</a:t>
             </a:r>
           </a:p>

</xml_diff>